<commit_message>
mod 1& 2 additions
</commit_message>
<xml_diff>
--- a/slides/module1.pptx
+++ b/slides/module1.pptx
@@ -129,10 +129,10 @@
   </p:defaultTextStyle>
   <p:extLst>
     <p:ext uri="{EFAFB233-063F-42B5-8137-9DF3F51BA10A}">
-      <p15:sldGuideLst xmlns="" xmlns:p15="http://schemas.microsoft.com/office/powerpoint/2012/main"/>
+      <p15:sldGuideLst xmlns:p15="http://schemas.microsoft.com/office/powerpoint/2012/main" xmlns=""/>
     </p:ext>
     <p:ext uri="{2D200454-40CA-4A62-9FC3-DE9A4176ACB9}">
-      <p15:notesGuideLst xmlns="" xmlns:p15="http://schemas.microsoft.com/office/powerpoint/2012/main"/>
+      <p15:notesGuideLst xmlns:p15="http://schemas.microsoft.com/office/powerpoint/2012/main" xmlns=""/>
     </p:ext>
   </p:extLst>
 </p:presentation>
@@ -1834,7 +1834,7 @@
   </p:timing>
   <p:extLst mod="1">
     <p:ext uri="{DCECCB84-F9BA-43D5-87BE-67443E8EF086}">
-      <p15:sldGuideLst xmlns="" xmlns:p15="http://schemas.microsoft.com/office/powerpoint/2012/main">
+      <p15:sldGuideLst xmlns:p15="http://schemas.microsoft.com/office/powerpoint/2012/main" xmlns="">
         <p15:guide id="1" orient="horz" pos="3792">
           <p15:clr>
             <a:srgbClr val="FBAE40"/>
@@ -2493,7 +2493,7 @@
   </p:timing>
   <p:extLst mod="1">
     <p:ext uri="{DCECCB84-F9BA-43D5-87BE-67443E8EF086}">
-      <p15:sldGuideLst xmlns="" xmlns:p15="http://schemas.microsoft.com/office/powerpoint/2012/main">
+      <p15:sldGuideLst xmlns:p15="http://schemas.microsoft.com/office/powerpoint/2012/main" xmlns="">
         <p15:guide id="1" orient="horz" pos="2160">
           <p15:clr>
             <a:srgbClr val="FBAE40"/>
@@ -4360,11 +4360,11 @@
           <a:p>
             <a:r>
               <a:rPr lang="en-US" dirty="0" smtClean="0"/>
-              <a:t>Easy </a:t>
-            </a:r>
-            <a:r>
-              <a:rPr lang="en-US" smtClean="0"/>
-              <a:t>to test</a:t>
+              <a:t>Easy to </a:t>
+            </a:r>
+            <a:r>
+              <a:rPr lang="en-US" dirty="0" smtClean="0"/>
+              <a:t>test</a:t>
             </a:r>
             <a:endParaRPr lang="en-US" dirty="0" smtClean="0"/>
           </a:p>
@@ -4465,7 +4465,78 @@
           <a:bodyPr/>
           <a:lstStyle/>
           <a:p>
-            <a:endParaRPr lang="en-US"/>
+            <a:pPr marL="0" indent="0">
+              <a:buNone/>
+            </a:pPr>
+            <a:r>
+              <a:rPr lang="en-US" dirty="0">
+                <a:hlinkClick r:id="rId2"/>
+              </a:rPr>
+              <a:t>https://docs.angularjs.org/misc/</a:t>
+            </a:r>
+            <a:r>
+              <a:rPr lang="en-US" dirty="0" smtClean="0">
+                <a:hlinkClick r:id="rId2"/>
+              </a:rPr>
+              <a:t>downloading</a:t>
+            </a:r>
+            <a:endParaRPr lang="en-US" dirty="0" smtClean="0"/>
+          </a:p>
+          <a:p>
+            <a:pPr marL="0" indent="0">
+              <a:buNone/>
+            </a:pPr>
+            <a:endParaRPr lang="en-US" dirty="0" smtClean="0"/>
+          </a:p>
+          <a:p>
+            <a:r>
+              <a:rPr lang="en-US" dirty="0" smtClean="0"/>
+              <a:t>Extremely lightweight – download/include only what you need</a:t>
+            </a:r>
+          </a:p>
+          <a:p>
+            <a:pPr lvl="1"/>
+            <a:r>
+              <a:rPr lang="en-US" b="1" dirty="0" err="1" smtClean="0"/>
+              <a:t>a</a:t>
+            </a:r>
+            <a:r>
+              <a:rPr lang="en-US" b="1" dirty="0" err="1" smtClean="0"/>
+              <a:t>ngular.js</a:t>
+            </a:r>
+            <a:endParaRPr lang="en-US" b="1" dirty="0" smtClean="0"/>
+          </a:p>
+          <a:p>
+            <a:pPr lvl="1"/>
+            <a:r>
+              <a:rPr lang="en-US" dirty="0" smtClean="0"/>
+              <a:t>angular-</a:t>
+            </a:r>
+            <a:r>
+              <a:rPr lang="en-US" dirty="0" err="1" smtClean="0"/>
+              <a:t>route.js</a:t>
+            </a:r>
+            <a:endParaRPr lang="en-US" dirty="0" smtClean="0"/>
+          </a:p>
+          <a:p>
+            <a:pPr lvl="1"/>
+            <a:r>
+              <a:rPr lang="en-US" dirty="0"/>
+              <a:t>a</a:t>
+            </a:r>
+            <a:r>
+              <a:rPr lang="en-US" dirty="0" smtClean="0"/>
+              <a:t>ngular-</a:t>
+            </a:r>
+            <a:r>
+              <a:rPr lang="en-US" dirty="0" err="1" smtClean="0"/>
+              <a:t>r</a:t>
+            </a:r>
+            <a:r>
+              <a:rPr lang="en-US" dirty="0" err="1" smtClean="0"/>
+              <a:t>esource.js</a:t>
+            </a:r>
+            <a:endParaRPr lang="en-US" dirty="0"/>
           </a:p>
         </p:txBody>
       </p:sp>
@@ -5406,14 +5477,14 @@
                 <a:gridCol w="5762625">
                   <a:extLst>
                     <a:ext uri="{9D8B030D-6E8A-4147-A177-3AD203B41FA5}">
-                      <a16:colId xmlns:a16="http://schemas.microsoft.com/office/drawing/2014/main" xmlns="" val="1632794655"/>
+                      <a16:colId xmlns="" xmlns:a16="http://schemas.microsoft.com/office/drawing/2014/main" val="1632794655"/>
                     </a:ext>
                   </a:extLst>
                 </a:gridCol>
                 <a:gridCol w="5762625">
                   <a:extLst>
                     <a:ext uri="{9D8B030D-6E8A-4147-A177-3AD203B41FA5}">
-                      <a16:colId xmlns:a16="http://schemas.microsoft.com/office/drawing/2014/main" xmlns="" val="2011313899"/>
+                      <a16:colId xmlns="" xmlns:a16="http://schemas.microsoft.com/office/drawing/2014/main" val="2011313899"/>
                     </a:ext>
                   </a:extLst>
                 </a:gridCol>
@@ -5448,7 +5519,7 @@
                 </a:tc>
                 <a:extLst>
                   <a:ext uri="{0D108BD9-81ED-4DB2-BD59-A6C34878D82A}">
-                    <a16:rowId xmlns:a16="http://schemas.microsoft.com/office/drawing/2014/main" xmlns="" val="1789177411"/>
+                    <a16:rowId xmlns="" xmlns:a16="http://schemas.microsoft.com/office/drawing/2014/main" val="1789177411"/>
                   </a:ext>
                 </a:extLst>
               </a:tr>
@@ -5490,14 +5561,7 @@
                           <a:latin typeface="Segoe UI Light" panose="020B0502040204020203" pitchFamily="34" charset="0"/>
                           <a:cs typeface="Segoe UI Light" panose="020B0502040204020203" pitchFamily="34" charset="0"/>
                         </a:rPr>
-                        <a:t>04 </a:t>
-                      </a:r>
-                      <a:r>
-                        <a:rPr lang="en-US" sz="2400" dirty="0" smtClean="0">
-                          <a:latin typeface="Segoe UI Light" panose="020B0502040204020203" pitchFamily="34" charset="0"/>
-                          <a:cs typeface="Segoe UI Light" panose="020B0502040204020203" pitchFamily="34" charset="0"/>
-                        </a:rPr>
-                        <a:t>| Integrating</a:t>
+                        <a:t>04 | Integrating</a:t>
                       </a:r>
                       <a:r>
                         <a:rPr lang="en-US" sz="2400" baseline="0" dirty="0" smtClean="0">
@@ -5523,7 +5587,7 @@
                 </a:tc>
                 <a:extLst>
                   <a:ext uri="{0D108BD9-81ED-4DB2-BD59-A6C34878D82A}">
-                    <a16:rowId xmlns:a16="http://schemas.microsoft.com/office/drawing/2014/main" xmlns="" val="3842815335"/>
+                    <a16:rowId xmlns="" xmlns:a16="http://schemas.microsoft.com/office/drawing/2014/main" val="3842815335"/>
                   </a:ext>
                 </a:extLst>
               </a:tr>
@@ -5565,14 +5629,7 @@
                           <a:latin typeface="Segoe UI Light" panose="020B0502040204020203" pitchFamily="34" charset="0"/>
                           <a:cs typeface="Segoe UI Light" panose="020B0502040204020203" pitchFamily="34" charset="0"/>
                         </a:rPr>
-                        <a:t>05 </a:t>
-                      </a:r>
-                      <a:r>
-                        <a:rPr lang="en-US" sz="2400" dirty="0" smtClean="0">
-                          <a:latin typeface="Segoe UI Light" panose="020B0502040204020203" pitchFamily="34" charset="0"/>
-                          <a:cs typeface="Segoe UI Light" panose="020B0502040204020203" pitchFamily="34" charset="0"/>
-                        </a:rPr>
-                        <a:t>|  Tying things together</a:t>
+                        <a:t>05 |  Tying things together</a:t>
                       </a:r>
                       <a:endParaRPr lang="en-US" sz="2400" dirty="0">
                         <a:latin typeface="Segoe UI Light" panose="020B0502040204020203" pitchFamily="34" charset="0"/>
@@ -5584,7 +5641,7 @@
                 </a:tc>
                 <a:extLst>
                   <a:ext uri="{0D108BD9-81ED-4DB2-BD59-A6C34878D82A}">
-                    <a16:rowId xmlns:a16="http://schemas.microsoft.com/office/drawing/2014/main" xmlns="" val="321066646"/>
+                    <a16:rowId xmlns="" xmlns:a16="http://schemas.microsoft.com/office/drawing/2014/main" val="321066646"/>
                   </a:ext>
                 </a:extLst>
               </a:tr>
@@ -5679,7 +5736,7 @@
                 </a:tc>
                 <a:extLst>
                   <a:ext uri="{0D108BD9-81ED-4DB2-BD59-A6C34878D82A}">
-                    <a16:rowId xmlns:a16="http://schemas.microsoft.com/office/drawing/2014/main" xmlns="" val="3812060533"/>
+                    <a16:rowId xmlns="" xmlns:a16="http://schemas.microsoft.com/office/drawing/2014/main" val="3812060533"/>
                   </a:ext>
                 </a:extLst>
               </a:tr>
@@ -6864,7 +6921,7 @@
   <a:extraClrSchemeLst/>
   <a:extLst>
     <a:ext uri="{05A4C25C-085E-4340-85A3-A5531E510DB2}">
-      <thm15:themeFamily xmlns="" xmlns:thm15="http://schemas.microsoft.com/office/thememl/2012/main" name="Office Theme" id="{62F939B6-93AF-4DB8-9C6B-D6C7DFDC589F}" vid="{4A3C46E8-61CC-4603-A589-7422A47A8E4A}"/>
+      <thm15:themeFamily xmlns:thm15="http://schemas.microsoft.com/office/thememl/2012/main" xmlns="" name="Office Theme" id="{62F939B6-93AF-4DB8-9C6B-D6C7DFDC589F}" vid="{4A3C46E8-61CC-4603-A589-7422A47A8E4A}"/>
     </a:ext>
   </a:extLst>
 </a:theme>
@@ -7125,7 +7182,7 @@
   <a:extraClrSchemeLst/>
   <a:extLst>
     <a:ext uri="{05A4C25C-085E-4340-85A3-A5531E510DB2}">
-      <thm15:themeFamily xmlns="" xmlns:thm15="http://schemas.microsoft.com/office/thememl/2012/main" name="Office Theme" id="{62F939B6-93AF-4DB8-9C6B-D6C7DFDC589F}" vid="{4A3C46E8-61CC-4603-A589-7422A47A8E4A}"/>
+      <thm15:themeFamily xmlns:thm15="http://schemas.microsoft.com/office/thememl/2012/main" xmlns="" name="Office Theme" id="{62F939B6-93AF-4DB8-9C6B-D6C7DFDC589F}" vid="{4A3C46E8-61CC-4603-A589-7422A47A8E4A}"/>
     </a:ext>
   </a:extLst>
 </a:theme>

</xml_diff>